<commit_message>
update and add all figures
</commit_message>
<xml_diff>
--- a/Figures.&.Tables/COMMAND/COMMAND_pipelines.pptx
+++ b/Figures.&.Tables/COMMAND/COMMAND_pipelines.pptx
@@ -289,7 +289,7 @@
             <a:fld id="{1D8BD707-D9CF-40AE-B4C6-C98DA3205C09}" type="datetimeFigureOut">
               <a:rPr lang="en-US" smtClean="0"/>
               <a:pPr/>
-              <a:t>6/3/2014</a:t>
+              <a:t>7/10/2014</a:t>
             </a:fld>
             <a:endParaRPr lang="en-US"/>
           </a:p>
@@ -456,7 +456,7 @@
             <a:fld id="{1D8BD707-D9CF-40AE-B4C6-C98DA3205C09}" type="datetimeFigureOut">
               <a:rPr lang="en-US" smtClean="0"/>
               <a:pPr/>
-              <a:t>6/3/2014</a:t>
+              <a:t>7/10/2014</a:t>
             </a:fld>
             <a:endParaRPr lang="en-US"/>
           </a:p>
@@ -633,7 +633,7 @@
             <a:fld id="{1D8BD707-D9CF-40AE-B4C6-C98DA3205C09}" type="datetimeFigureOut">
               <a:rPr lang="en-US" smtClean="0"/>
               <a:pPr/>
-              <a:t>6/3/2014</a:t>
+              <a:t>7/10/2014</a:t>
             </a:fld>
             <a:endParaRPr lang="en-US"/>
           </a:p>
@@ -800,7 +800,7 @@
             <a:fld id="{1D8BD707-D9CF-40AE-B4C6-C98DA3205C09}" type="datetimeFigureOut">
               <a:rPr lang="en-US" smtClean="0"/>
               <a:pPr/>
-              <a:t>6/3/2014</a:t>
+              <a:t>7/10/2014</a:t>
             </a:fld>
             <a:endParaRPr lang="en-US"/>
           </a:p>
@@ -1043,7 +1043,7 @@
             <a:fld id="{1D8BD707-D9CF-40AE-B4C6-C98DA3205C09}" type="datetimeFigureOut">
               <a:rPr lang="en-US" smtClean="0"/>
               <a:pPr/>
-              <a:t>6/3/2014</a:t>
+              <a:t>7/10/2014</a:t>
             </a:fld>
             <a:endParaRPr lang="en-US"/>
           </a:p>
@@ -1328,7 +1328,7 @@
             <a:fld id="{1D8BD707-D9CF-40AE-B4C6-C98DA3205C09}" type="datetimeFigureOut">
               <a:rPr lang="en-US" smtClean="0"/>
               <a:pPr/>
-              <a:t>6/3/2014</a:t>
+              <a:t>7/10/2014</a:t>
             </a:fld>
             <a:endParaRPr lang="en-US"/>
           </a:p>
@@ -1747,7 +1747,7 @@
             <a:fld id="{1D8BD707-D9CF-40AE-B4C6-C98DA3205C09}" type="datetimeFigureOut">
               <a:rPr lang="en-US" smtClean="0"/>
               <a:pPr/>
-              <a:t>6/3/2014</a:t>
+              <a:t>7/10/2014</a:t>
             </a:fld>
             <a:endParaRPr lang="en-US"/>
           </a:p>
@@ -1862,7 +1862,7 @@
             <a:fld id="{1D8BD707-D9CF-40AE-B4C6-C98DA3205C09}" type="datetimeFigureOut">
               <a:rPr lang="en-US" smtClean="0"/>
               <a:pPr/>
-              <a:t>6/3/2014</a:t>
+              <a:t>7/10/2014</a:t>
             </a:fld>
             <a:endParaRPr lang="en-US"/>
           </a:p>
@@ -1954,7 +1954,7 @@
             <a:fld id="{1D8BD707-D9CF-40AE-B4C6-C98DA3205C09}" type="datetimeFigureOut">
               <a:rPr lang="en-US" smtClean="0"/>
               <a:pPr/>
-              <a:t>6/3/2014</a:t>
+              <a:t>7/10/2014</a:t>
             </a:fld>
             <a:endParaRPr lang="en-US"/>
           </a:p>
@@ -2228,7 +2228,7 @@
             <a:fld id="{1D8BD707-D9CF-40AE-B4C6-C98DA3205C09}" type="datetimeFigureOut">
               <a:rPr lang="en-US" smtClean="0"/>
               <a:pPr/>
-              <a:t>6/3/2014</a:t>
+              <a:t>7/10/2014</a:t>
             </a:fld>
             <a:endParaRPr lang="en-US"/>
           </a:p>
@@ -2478,7 +2478,7 @@
             <a:fld id="{1D8BD707-D9CF-40AE-B4C6-C98DA3205C09}" type="datetimeFigureOut">
               <a:rPr lang="en-US" smtClean="0"/>
               <a:pPr/>
-              <a:t>6/3/2014</a:t>
+              <a:t>7/10/2014</a:t>
             </a:fld>
             <a:endParaRPr lang="en-US"/>
           </a:p>
@@ -2688,7 +2688,7 @@
             <a:fld id="{1D8BD707-D9CF-40AE-B4C6-C98DA3205C09}" type="datetimeFigureOut">
               <a:rPr lang="en-US" smtClean="0"/>
               <a:pPr/>
-              <a:t>6/3/2014</a:t>
+              <a:t>7/10/2014</a:t>
             </a:fld>
             <a:endParaRPr lang="en-US"/>
           </a:p>
@@ -3112,7 +3112,7 @@
                 </a:solidFill>
                 <a:latin typeface="Corbel" pitchFamily="34" charset="0"/>
               </a:rPr>
-              <a:t>LOWESS</a:t>
+              <a:t>LOESS</a:t>
             </a:r>
             <a:endParaRPr lang="en-US" sz="1400" b="1" dirty="0">
               <a:solidFill>
@@ -3243,7 +3243,7 @@
                 </a:solidFill>
                 <a:latin typeface="Corbel" pitchFamily="34" charset="0"/>
               </a:rPr>
-              <a:t>LOWESS</a:t>
+              <a:t>LOESS</a:t>
             </a:r>
           </a:p>
           <a:p>
@@ -3503,7 +3503,7 @@
                 </a:solidFill>
                 <a:latin typeface="Corbel" pitchFamily="34" charset="0"/>
               </a:rPr>
-              <a:t>LOWESS</a:t>
+              <a:t>LOESS</a:t>
             </a:r>
           </a:p>
           <a:p>
@@ -3830,7 +3830,7 @@
         <p:spPr>
           <a:xfrm>
             <a:off x="1075319" y="5337955"/>
-            <a:ext cx="1896481" cy="338554"/>
+            <a:ext cx="2981714" cy="338554"/>
           </a:xfrm>
           <a:prstGeom prst="rect">
             <a:avLst/>
@@ -3845,7 +3845,11 @@
           <a:p>
             <a:r>
               <a:rPr lang="en-US" sz="1600" b="1" dirty="0" smtClean="0"/>
-              <a:t>single-channel array</a:t>
+              <a:t>high density single-channel </a:t>
+            </a:r>
+            <a:r>
+              <a:rPr lang="en-US" sz="1600" b="1" dirty="0" smtClean="0"/>
+              <a:t>array</a:t>
             </a:r>
             <a:endParaRPr lang="en-US" sz="1600" b="1" dirty="0"/>
           </a:p>
@@ -3964,7 +3968,8 @@
           </a:prstGeom>
           <a:solidFill>
             <a:schemeClr val="accent2">
-              <a:lumMod val="75000"/>
+              <a:lumMod val="60000"/>
+              <a:lumOff val="40000"/>
             </a:schemeClr>
           </a:solidFill>
           <a:ln>
@@ -4014,7 +4019,8 @@
           </a:prstGeom>
           <a:solidFill>
             <a:schemeClr val="accent2">
-              <a:lumMod val="75000"/>
+              <a:lumMod val="60000"/>
+              <a:lumOff val="40000"/>
             </a:schemeClr>
           </a:solidFill>
           <a:ln>
@@ -4064,7 +4070,8 @@
           </a:prstGeom>
           <a:solidFill>
             <a:schemeClr val="accent2">
-              <a:lumMod val="75000"/>
+              <a:lumMod val="60000"/>
+              <a:lumOff val="40000"/>
             </a:schemeClr>
           </a:solidFill>
           <a:ln>
@@ -4114,7 +4121,8 @@
           </a:prstGeom>
           <a:solidFill>
             <a:schemeClr val="accent2">
-              <a:lumMod val="75000"/>
+              <a:lumMod val="60000"/>
+              <a:lumOff val="40000"/>
             </a:schemeClr>
           </a:solidFill>
           <a:ln>

</xml_diff>